<commit_message>
run files for the b tagging SF plots
</commit_message>
<xml_diff>
--- a/Weekly Meetings/HEP_Weekly_15July2020.pptx
+++ b/Weekly Meetings/HEP_Weekly_15July2020.pptx
@@ -216,7 +216,7 @@
           <a:p>
             <a:fld id="{EC97F6CE-C9BA-5B44-AF0F-C73B1C17650F}" type="datetime1">
               <a:rPr lang="en-US" smtClean="0"/>
-              <a:t>7/15/20</a:t>
+              <a:t>9/1/20</a:t>
             </a:fld>
             <a:endParaRPr lang="en-GB"/>
           </a:p>
@@ -422,7 +422,7 @@
           <a:p>
             <a:fld id="{7F9D4A26-E586-E648-884B-C9B1EA03133F}" type="datetime1">
               <a:rPr lang="en-US" smtClean="0"/>
-              <a:t>7/15/20</a:t>
+              <a:t>9/1/20</a:t>
             </a:fld>
             <a:endParaRPr lang="en-GB"/>
           </a:p>
@@ -756,7 +756,7 @@
           <a:p>
             <a:fld id="{33D9703A-F6B0-E34C-B7F9-5A8864FF4F07}" type="datetime1">
               <a:rPr lang="en-US" smtClean="0"/>
-              <a:t>7/15/20</a:t>
+              <a:t>9/1/20</a:t>
             </a:fld>
             <a:endParaRPr lang="en-GB"/>
           </a:p>
@@ -863,7 +863,7 @@
           <a:p>
             <a:fld id="{7F9D4A26-E586-E648-884B-C9B1EA03133F}" type="datetime1">
               <a:rPr lang="en-US" smtClean="0"/>
-              <a:t>7/15/20</a:t>
+              <a:t>9/1/20</a:t>
             </a:fld>
             <a:endParaRPr lang="en-GB"/>
           </a:p>
@@ -1131,7 +1131,7 @@
           <a:p>
             <a:fld id="{DC51A3BE-CA11-4547-A39A-766971096B34}" type="datetime1">
               <a:rPr lang="en-US" smtClean="0"/>
-              <a:t>7/15/20</a:t>
+              <a:t>9/1/20</a:t>
             </a:fld>
             <a:endParaRPr lang="en-US" dirty="0"/>
           </a:p>
@@ -1338,7 +1338,7 @@
           <a:p>
             <a:fld id="{42B2CF9A-A7BF-1245-99D9-4054301C36E0}" type="datetime1">
               <a:rPr lang="en-US" smtClean="0"/>
-              <a:t>7/15/20</a:t>
+              <a:t>9/1/20</a:t>
             </a:fld>
             <a:endParaRPr lang="en-US" dirty="0"/>
           </a:p>
@@ -1593,7 +1593,7 @@
           <a:p>
             <a:fld id="{F88F3968-5050-1740-9AB7-A06844E87E5F}" type="datetime1">
               <a:rPr lang="en-US" smtClean="0"/>
-              <a:t>7/15/20</a:t>
+              <a:t>9/1/20</a:t>
             </a:fld>
             <a:endParaRPr lang="en-US" dirty="0"/>
           </a:p>
@@ -1784,7 +1784,7 @@
           <a:p>
             <a:fld id="{6A19A844-E33A-B644-A0FB-7455E93D924C}" type="datetime1">
               <a:rPr lang="en-US" smtClean="0"/>
-              <a:t>7/15/20</a:t>
+              <a:t>9/1/20</a:t>
             </a:fld>
             <a:endParaRPr lang="en-GB"/>
           </a:p>
@@ -1958,7 +1958,7 @@
           <a:p>
             <a:fld id="{F61E92BF-DA59-B546-88AE-9835521A3798}" type="datetime1">
               <a:rPr lang="en-US" smtClean="0"/>
-              <a:t>7/15/20</a:t>
+              <a:t>9/1/20</a:t>
             </a:fld>
             <a:endParaRPr lang="en-GB"/>
           </a:p>
@@ -2208,7 +2208,7 @@
           <a:p>
             <a:fld id="{61C78CAC-926A-EF4D-9608-460C3A301243}" type="datetime1">
               <a:rPr lang="en-US" smtClean="0"/>
-              <a:t>7/15/20</a:t>
+              <a:t>9/1/20</a:t>
             </a:fld>
             <a:endParaRPr lang="en-GB"/>
           </a:p>
@@ -2444,7 +2444,7 @@
           <a:p>
             <a:fld id="{32675A6D-6B9B-6546-A3DC-004E809EED54}" type="datetime1">
               <a:rPr lang="en-US" smtClean="0"/>
-              <a:t>7/15/20</a:t>
+              <a:t>9/1/20</a:t>
             </a:fld>
             <a:endParaRPr lang="en-GB"/>
           </a:p>
@@ -2815,7 +2815,7 @@
           <a:p>
             <a:fld id="{55D89806-B328-B147-9EC9-15D0307996ED}" type="datetime1">
               <a:rPr lang="en-US" smtClean="0"/>
-              <a:t>7/15/20</a:t>
+              <a:t>9/1/20</a:t>
             </a:fld>
             <a:endParaRPr lang="en-GB"/>
           </a:p>
@@ -2937,7 +2937,7 @@
           <a:p>
             <a:fld id="{702FE0D6-14B8-A94B-B441-7BA984189CE2}" type="datetime1">
               <a:rPr lang="en-US" smtClean="0"/>
-              <a:t>7/15/20</a:t>
+              <a:t>9/1/20</a:t>
             </a:fld>
             <a:endParaRPr lang="en-GB"/>
           </a:p>
@@ -3036,7 +3036,7 @@
           <a:p>
             <a:fld id="{4C294EA8-7AEB-3247-9A81-8483D03B0462}" type="datetime1">
               <a:rPr lang="en-US" smtClean="0"/>
-              <a:t>7/15/20</a:t>
+              <a:t>9/1/20</a:t>
             </a:fld>
             <a:endParaRPr lang="en-GB"/>
           </a:p>
@@ -3317,7 +3317,7 @@
           <a:p>
             <a:fld id="{D72E9315-386E-6846-8498-4330F1BBFC0A}" type="datetime1">
               <a:rPr lang="en-US" smtClean="0"/>
-              <a:t>7/15/20</a:t>
+              <a:t>9/1/20</a:t>
             </a:fld>
             <a:endParaRPr lang="en-GB"/>
           </a:p>
@@ -3473,7 +3473,7 @@
           <a:p>
             <a:fld id="{0E394EB9-E681-C34A-89D4-D81E4C62EA5B}" type="datetime1">
               <a:rPr lang="en-US" smtClean="0"/>
-              <a:t>7/15/20</a:t>
+              <a:t>9/1/20</a:t>
             </a:fld>
             <a:endParaRPr lang="en-US" dirty="0"/>
           </a:p>
@@ -3754,7 +3754,7 @@
           <a:p>
             <a:fld id="{E220BF5D-E794-2B42-91EC-2A3B4450069D}" type="datetime1">
               <a:rPr lang="en-US" smtClean="0"/>
-              <a:t>7/15/20</a:t>
+              <a:t>9/1/20</a:t>
             </a:fld>
             <a:endParaRPr lang="en-GB"/>
           </a:p>
@@ -3928,7 +3928,7 @@
           <a:p>
             <a:fld id="{BA4C039E-7082-7D42-AA91-9FF3EF6ADB5B}" type="datetime1">
               <a:rPr lang="en-US" smtClean="0"/>
-              <a:t>7/15/20</a:t>
+              <a:t>9/1/20</a:t>
             </a:fld>
             <a:endParaRPr lang="en-GB"/>
           </a:p>
@@ -4112,7 +4112,7 @@
           <a:p>
             <a:fld id="{2817B3FE-3894-A848-8D78-14007FB2FF94}" type="datetime1">
               <a:rPr lang="en-US" smtClean="0"/>
-              <a:t>7/15/20</a:t>
+              <a:t>9/1/20</a:t>
             </a:fld>
             <a:endParaRPr lang="en-GB"/>
           </a:p>
@@ -4459,7 +4459,7 @@
           <a:p>
             <a:fld id="{2DEEC64B-3E48-2F44-A6A9-A1C06A2C021E}" type="datetime1">
               <a:rPr lang="en-US" smtClean="0"/>
-              <a:t>7/15/20</a:t>
+              <a:t>9/1/20</a:t>
             </a:fld>
             <a:endParaRPr lang="en-US" dirty="0"/>
           </a:p>
@@ -4733,7 +4733,7 @@
           <a:p>
             <a:fld id="{61E195D8-183A-7F4D-8D17-8ADC90214B8A}" type="datetime1">
               <a:rPr lang="en-US" smtClean="0"/>
-              <a:t>7/15/20</a:t>
+              <a:t>9/1/20</a:t>
             </a:fld>
             <a:endParaRPr lang="en-US" dirty="0"/>
           </a:p>
@@ -5111,7 +5111,7 @@
           <a:p>
             <a:fld id="{0DD0A991-48AE-1D43-8113-23F8EAF6681B}" type="datetime1">
               <a:rPr lang="en-US" smtClean="0"/>
-              <a:t>7/15/20</a:t>
+              <a:t>9/1/20</a:t>
             </a:fld>
             <a:endParaRPr lang="en-US" dirty="0"/>
           </a:p>
@@ -5228,7 +5228,7 @@
           <a:p>
             <a:fld id="{DC12579A-EC7F-EB4A-BC5C-80733D051D29}" type="datetime1">
               <a:rPr lang="en-US" smtClean="0"/>
-              <a:t>7/15/20</a:t>
+              <a:t>9/1/20</a:t>
             </a:fld>
             <a:endParaRPr lang="en-US" dirty="0"/>
           </a:p>
@@ -5398,7 +5398,7 @@
           <a:p>
             <a:fld id="{669454CD-6DAB-7942-9B1D-8F3E2B882464}" type="datetime1">
               <a:rPr lang="en-US" smtClean="0"/>
-              <a:t>7/15/20</a:t>
+              <a:t>9/1/20</a:t>
             </a:fld>
             <a:endParaRPr lang="en-US" dirty="0"/>
           </a:p>
@@ -5782,7 +5782,7 @@
           <a:p>
             <a:fld id="{BD2CAD36-D42B-D445-A707-AA59905C7768}" type="datetime1">
               <a:rPr lang="en-US" smtClean="0"/>
-              <a:t>7/15/20</a:t>
+              <a:t>9/1/20</a:t>
             </a:fld>
             <a:endParaRPr lang="en-US" dirty="0"/>
           </a:p>
@@ -6164,7 +6164,7 @@
           <a:p>
             <a:fld id="{2D1D63B8-BB32-E649-92D4-94351543394C}" type="datetime1">
               <a:rPr lang="en-US" smtClean="0"/>
-              <a:t>7/15/20</a:t>
+              <a:t>9/1/20</a:t>
             </a:fld>
             <a:endParaRPr lang="en-US" dirty="0"/>
           </a:p>
@@ -6450,7 +6450,7 @@
           <a:p>
             <a:fld id="{FD02AE22-A9EA-FE42-BAB8-AD1D7606FF2E}" type="datetime1">
               <a:rPr lang="en-US" smtClean="0"/>
-              <a:t>7/15/20</a:t>
+              <a:t>9/1/20</a:t>
             </a:fld>
             <a:endParaRPr lang="en-US" dirty="0"/>
           </a:p>
@@ -7140,7 +7140,7 @@
           <a:p>
             <a:fld id="{307A731C-B4EF-644F-8FDB-2EBA3EC9415A}" type="datetime1">
               <a:rPr lang="en-US" smtClean="0"/>
-              <a:t>7/15/20</a:t>
+              <a:t>9/1/20</a:t>
             </a:fld>
             <a:endParaRPr lang="en-GB"/>
           </a:p>
@@ -7848,7 +7848,7 @@
           <a:p>
             <a:fld id="{D52D66B2-0E0A-F441-A1DA-8039F615D612}" type="datetime1">
               <a:rPr lang="en-US" smtClean="0"/>
-              <a:t>7/15/20</a:t>
+              <a:t>9/1/20</a:t>
             </a:fld>
             <a:endParaRPr lang="en-US" dirty="0"/>
           </a:p>
@@ -8233,7 +8233,7 @@
           <a:p>
             <a:fld id="{D52D66B2-0E0A-F441-A1DA-8039F615D612}" type="datetime1">
               <a:rPr lang="en-US" smtClean="0"/>
-              <a:t>7/15/20</a:t>
+              <a:t>9/1/20</a:t>
             </a:fld>
             <a:endParaRPr lang="en-US" dirty="0"/>
           </a:p>
@@ -8614,7 +8614,7 @@
           <a:p>
             <a:fld id="{D52D66B2-0E0A-F441-A1DA-8039F615D612}" type="datetime1">
               <a:rPr lang="en-US" smtClean="0"/>
-              <a:t>7/15/20</a:t>
+              <a:t>9/1/20</a:t>
             </a:fld>
             <a:endParaRPr lang="en-US" dirty="0"/>
           </a:p>
@@ -8995,7 +8995,7 @@
           <a:p>
             <a:fld id="{D52D66B2-0E0A-F441-A1DA-8039F615D612}" type="datetime1">
               <a:rPr lang="en-US" smtClean="0"/>
-              <a:t>7/15/20</a:t>
+              <a:t>9/1/20</a:t>
             </a:fld>
             <a:endParaRPr lang="en-US" dirty="0"/>
           </a:p>
@@ -9268,7 +9268,7 @@
           <a:p>
             <a:fld id="{37E2C1DD-94AF-5B41-A54A-0C8426B7BC1A}" type="datetime1">
               <a:rPr lang="en-US" smtClean="0"/>
-              <a:t>7/15/20</a:t>
+              <a:t>9/1/20</a:t>
             </a:fld>
             <a:endParaRPr lang="en-US" dirty="0"/>
           </a:p>
@@ -9350,8 +9350,8 @@
           </a:p>
         </p:txBody>
       </p:sp>
-      <mc:AlternateContent xmlns:mc="http://schemas.openxmlformats.org/markup-compatibility/2006">
-        <mc:Choice xmlns:a14="http://schemas.microsoft.com/office/drawing/2010/main" Requires="a14">
+      <mc:AlternateContent xmlns:mc="http://schemas.openxmlformats.org/markup-compatibility/2006" xmlns:a14="http://schemas.microsoft.com/office/drawing/2010/main">
+        <mc:Choice Requires="a14">
           <p:sp>
             <p:nvSpPr>
               <p:cNvPr id="7" name="TextBox 6"/>
@@ -10132,7 +10132,7 @@
             </p:txBody>
           </p:sp>
         </mc:Choice>
-        <mc:Fallback>
+        <mc:Fallback xmlns="">
           <p:sp>
             <p:nvSpPr>
               <p:cNvPr id="7" name="TextBox 6"/>
@@ -10321,7 +10321,7 @@
           <a:p>
             <a:fld id="{F7AFF6A5-F1FB-284A-BF72-2836D5A0B341}" type="datetime1">
               <a:rPr lang="en-US" smtClean="0"/>
-              <a:t>7/15/20</a:t>
+              <a:t>9/1/20</a:t>
             </a:fld>
             <a:endParaRPr lang="en-US" dirty="0"/>
           </a:p>
@@ -11388,7 +11388,7 @@
           <a:p>
             <a:fld id="{D52D66B2-0E0A-F441-A1DA-8039F615D612}" type="datetime1">
               <a:rPr lang="en-US" smtClean="0"/>
-              <a:t>7/15/20</a:t>
+              <a:t>9/1/20</a:t>
             </a:fld>
             <a:endParaRPr lang="en-US" dirty="0"/>
           </a:p>
@@ -11760,7 +11760,7 @@
           <a:p>
             <a:fld id="{D52D66B2-0E0A-F441-A1DA-8039F615D612}" type="datetime1">
               <a:rPr lang="en-US" smtClean="0"/>
-              <a:t>7/15/20</a:t>
+              <a:t>9/1/20</a:t>
             </a:fld>
             <a:endParaRPr lang="en-US" dirty="0"/>
           </a:p>
@@ -12037,7 +12037,7 @@
           <a:p>
             <a:fld id="{D52D66B2-0E0A-F441-A1DA-8039F615D612}" type="datetime1">
               <a:rPr lang="en-US" smtClean="0"/>
-              <a:t>7/15/20</a:t>
+              <a:t>9/1/20</a:t>
             </a:fld>
             <a:endParaRPr lang="en-US" dirty="0"/>
           </a:p>
@@ -12314,7 +12314,7 @@
           <a:p>
             <a:fld id="{D52D66B2-0E0A-F441-A1DA-8039F615D612}" type="datetime1">
               <a:rPr lang="en-US" smtClean="0"/>
-              <a:t>7/15/20</a:t>
+              <a:t>9/1/20</a:t>
             </a:fld>
             <a:endParaRPr lang="en-US" dirty="0"/>
           </a:p>
@@ -12625,7 +12625,7 @@
           <a:p>
             <a:fld id="{D52D66B2-0E0A-F441-A1DA-8039F615D612}" type="datetime1">
               <a:rPr lang="en-US" smtClean="0"/>
-              <a:t>7/15/20</a:t>
+              <a:t>9/1/20</a:t>
             </a:fld>
             <a:endParaRPr lang="en-US" dirty="0"/>
           </a:p>
@@ -13010,7 +13010,7 @@
           <a:p>
             <a:fld id="{D52D66B2-0E0A-F441-A1DA-8039F615D612}" type="datetime1">
               <a:rPr lang="en-US" smtClean="0"/>
-              <a:t>7/15/20</a:t>
+              <a:t>9/1/20</a:t>
             </a:fld>
             <a:endParaRPr lang="en-US" dirty="0"/>
           </a:p>

</xml_diff>